<commit_message>
update log threads and Table of compounds for kept experiences
</commit_message>
<xml_diff>
--- a/slides/Meeting Bastien-Vera-Luca 05042025.pptx
+++ b/slides/Meeting Bastien-Vera-Luca 05042025.pptx
@@ -5,7 +5,7 @@
     <p:sldMasterId id="2147483648" r:id="rId1"/>
   </p:sldMasterIdLst>
   <p:notesMasterIdLst>
-    <p:notesMasterId r:id="rId14"/>
+    <p:notesMasterId r:id="rId17"/>
   </p:notesMasterIdLst>
   <p:sldIdLst>
     <p:sldId id="256" r:id="rId2"/>
@@ -17,9 +17,12 @@
     <p:sldId id="262" r:id="rId8"/>
     <p:sldId id="263" r:id="rId9"/>
     <p:sldId id="264" r:id="rId10"/>
-    <p:sldId id="266" r:id="rId11"/>
-    <p:sldId id="267" r:id="rId12"/>
-    <p:sldId id="265" r:id="rId13"/>
+    <p:sldId id="268" r:id="rId11"/>
+    <p:sldId id="269" r:id="rId12"/>
+    <p:sldId id="270" r:id="rId13"/>
+    <p:sldId id="266" r:id="rId14"/>
+    <p:sldId id="267" r:id="rId15"/>
+    <p:sldId id="265" r:id="rId16"/>
   </p:sldIdLst>
   <p:sldSz cx="9144000" cy="6858000" type="screen4x3"/>
   <p:notesSz cx="6858000" cy="9144000"/>
@@ -253,11 +256,145 @@
     </a:lvl9pPr>
   </p:defaultTextStyle>
   <p:extLst>
+    <p:ext uri="{EFAFB233-063F-42B5-8137-9DF3F51BA10A}">
+      <p15:sldGuideLst xmlns:p15="http://schemas.microsoft.com/office/powerpoint/2012/main"/>
+    </p:ext>
     <p:ext uri="GoogleSlidesCustomDataVersion2">
-      <go:slidesCustomData xmlns:go="http://customooxmlschemas.google.com/" xmlns:ahyp="http://schemas.microsoft.com/office/drawing/2018/hyperlinkcolor" xmlns:p15="http://schemas.microsoft.com/office/powerpoint/2012/main" xmlns:p14="http://schemas.microsoft.com/office/powerpoint/2010/main" xmlns:com="http://schemas.openxmlformats.org/drawingml/2006/compatibility" xmlns:pvml="urn:schemas-microsoft-com:office:powerpoint" xmlns:v="urn:schemas-microsoft-com:vml" xmlns:o="urn:schemas-microsoft-com:office:office" xmlns:dgm="http://schemas.openxmlformats.org/drawingml/2006/diagram" xmlns:c="http://schemas.openxmlformats.org/drawingml/2006/chart" xmlns:mv="urn:schemas-microsoft-com:mac:vml" xmlns:mc="http://schemas.openxmlformats.org/markup-compatibility/2006" xmlns="" r:id="rId18" roundtripDataSignature="AMtx7mj4SFm2X72Fo98NdnbRavGiU4cpIg=="/>
+      <go:slidesCustomData xmlns="" xmlns:mc="http://schemas.openxmlformats.org/markup-compatibility/2006" xmlns:mv="urn:schemas-microsoft-com:mac:vml" xmlns:c="http://schemas.openxmlformats.org/drawingml/2006/chart" xmlns:dgm="http://schemas.openxmlformats.org/drawingml/2006/diagram" xmlns:o="urn:schemas-microsoft-com:office:office" xmlns:v="urn:schemas-microsoft-com:vml" xmlns:pvml="urn:schemas-microsoft-com:office:powerpoint" xmlns:com="http://schemas.openxmlformats.org/drawingml/2006/compatibility" xmlns:p14="http://schemas.microsoft.com/office/powerpoint/2010/main" xmlns:p15="http://schemas.microsoft.com/office/powerpoint/2012/main" xmlns:ahyp="http://schemas.microsoft.com/office/drawing/2018/hyperlinkcolor" xmlns:go="http://customooxmlschemas.google.com/" r:id="rId18" roundtripDataSignature="AMtx7mj4SFm2X72Fo98NdnbRavGiU4cpIg=="/>
     </p:ext>
   </p:extLst>
 </p:presentation>
+</file>
+
+<file path=ppt/revisionInfo.xml><?xml version="1.0" encoding="utf-8"?>
+<p1510:revInfo xmlns:a="http://schemas.openxmlformats.org/drawingml/2006/main" xmlns:r="http://schemas.openxmlformats.org/officeDocument/2006/relationships" xmlns:p1510="http://schemas.microsoft.com/office/powerpoint/2015/10/main">
+  <p1510:revLst>
+    <p1510:client id="{DCBE6C67-F851-48B8-80F3-08E8D4311515}" v="9" dt="2025-05-07T13:43:30.905"/>
+  </p1510:revLst>
+</p1510:revInfo>
+</file>
+
+<file path=ppt/changesInfos/changesInfo1.xml><?xml version="1.0" encoding="utf-8"?>
+<pc:chgInfo xmlns:a="http://schemas.openxmlformats.org/drawingml/2006/main" xmlns:r="http://schemas.openxmlformats.org/officeDocument/2006/relationships" xmlns:ac="http://schemas.microsoft.com/office/drawing/2013/main/command" xmlns:pc="http://schemas.microsoft.com/office/powerpoint/2013/main/command">
+  <pc:docChgLst>
+    <pc:chgData name="bastien CHASSAGNOL" userId="5147dea5b81ac1f3" providerId="LiveId" clId="{DCBE6C67-F851-48B8-80F3-08E8D4311515}"/>
+    <pc:docChg chg="custSel addSld modSld">
+      <pc:chgData name="bastien CHASSAGNOL" userId="5147dea5b81ac1f3" providerId="LiveId" clId="{DCBE6C67-F851-48B8-80F3-08E8D4311515}" dt="2025-05-07T14:44:22.100" v="2266" actId="207"/>
+      <pc:docMkLst>
+        <pc:docMk/>
+      </pc:docMkLst>
+      <pc:sldChg chg="addSp delSp modSp new mod modClrScheme chgLayout">
+        <pc:chgData name="bastien CHASSAGNOL" userId="5147dea5b81ac1f3" providerId="LiveId" clId="{DCBE6C67-F851-48B8-80F3-08E8D4311515}" dt="2025-05-07T14:40:52.450" v="2265" actId="20577"/>
+        <pc:sldMkLst>
+          <pc:docMk/>
+          <pc:sldMk cId="170907872" sldId="268"/>
+        </pc:sldMkLst>
+        <pc:spChg chg="del mod ord">
+          <ac:chgData name="bastien CHASSAGNOL" userId="5147dea5b81ac1f3" providerId="LiveId" clId="{DCBE6C67-F851-48B8-80F3-08E8D4311515}" dt="2025-05-07T13:19:04.820" v="1" actId="700"/>
+          <ac:spMkLst>
+            <pc:docMk/>
+            <pc:sldMk cId="170907872" sldId="268"/>
+            <ac:spMk id="2" creationId="{FEB0CAA1-5EF9-6E25-1B5E-E158DB163AC3}"/>
+          </ac:spMkLst>
+        </pc:spChg>
+        <pc:spChg chg="del mod ord">
+          <ac:chgData name="bastien CHASSAGNOL" userId="5147dea5b81ac1f3" providerId="LiveId" clId="{DCBE6C67-F851-48B8-80F3-08E8D4311515}" dt="2025-05-07T13:19:04.820" v="1" actId="700"/>
+          <ac:spMkLst>
+            <pc:docMk/>
+            <pc:sldMk cId="170907872" sldId="268"/>
+            <ac:spMk id="3" creationId="{04399F67-7230-575E-EF99-F938AA71FD87}"/>
+          </ac:spMkLst>
+        </pc:spChg>
+        <pc:spChg chg="add mod ord">
+          <ac:chgData name="bastien CHASSAGNOL" userId="5147dea5b81ac1f3" providerId="LiveId" clId="{DCBE6C67-F851-48B8-80F3-08E8D4311515}" dt="2025-05-07T13:21:52.080" v="219" actId="14100"/>
+          <ac:spMkLst>
+            <pc:docMk/>
+            <pc:sldMk cId="170907872" sldId="268"/>
+            <ac:spMk id="4" creationId="{8BD1DA16-376F-5852-617D-EE0F8968645B}"/>
+          </ac:spMkLst>
+        </pc:spChg>
+        <pc:spChg chg="add mod ord">
+          <ac:chgData name="bastien CHASSAGNOL" userId="5147dea5b81ac1f3" providerId="LiveId" clId="{DCBE6C67-F851-48B8-80F3-08E8D4311515}" dt="2025-05-07T14:40:52.450" v="2265" actId="20577"/>
+          <ac:spMkLst>
+            <pc:docMk/>
+            <pc:sldMk cId="170907872" sldId="268"/>
+            <ac:spMk id="5" creationId="{CE8A50FD-3F56-089F-CB79-F31AE18CD699}"/>
+          </ac:spMkLst>
+        </pc:spChg>
+        <pc:spChg chg="add">
+          <ac:chgData name="bastien CHASSAGNOL" userId="5147dea5b81ac1f3" providerId="LiveId" clId="{DCBE6C67-F851-48B8-80F3-08E8D4311515}" dt="2025-05-07T13:25:44.451" v="322"/>
+          <ac:spMkLst>
+            <pc:docMk/>
+            <pc:sldMk cId="170907872" sldId="268"/>
+            <ac:spMk id="6" creationId="{6D52A415-9443-0294-3FD3-DAC6421BC3C9}"/>
+          </ac:spMkLst>
+        </pc:spChg>
+        <pc:spChg chg="add">
+          <ac:chgData name="bastien CHASSAGNOL" userId="5147dea5b81ac1f3" providerId="LiveId" clId="{DCBE6C67-F851-48B8-80F3-08E8D4311515}" dt="2025-05-07T13:31:59.044" v="607"/>
+          <ac:spMkLst>
+            <pc:docMk/>
+            <pc:sldMk cId="170907872" sldId="268"/>
+            <ac:spMk id="7" creationId="{28EFB38A-E8E7-9F41-903A-BE82639C3456}"/>
+          </ac:spMkLst>
+        </pc:spChg>
+      </pc:sldChg>
+      <pc:sldChg chg="addSp modSp new mod">
+        <pc:chgData name="bastien CHASSAGNOL" userId="5147dea5b81ac1f3" providerId="LiveId" clId="{DCBE6C67-F851-48B8-80F3-08E8D4311515}" dt="2025-05-07T14:44:22.100" v="2266" actId="207"/>
+        <pc:sldMkLst>
+          <pc:docMk/>
+          <pc:sldMk cId="4161119927" sldId="269"/>
+        </pc:sldMkLst>
+        <pc:spChg chg="mod">
+          <ac:chgData name="bastien CHASSAGNOL" userId="5147dea5b81ac1f3" providerId="LiveId" clId="{DCBE6C67-F851-48B8-80F3-08E8D4311515}" dt="2025-05-07T13:39:01.625" v="1314" actId="255"/>
+          <ac:spMkLst>
+            <pc:docMk/>
+            <pc:sldMk cId="4161119927" sldId="269"/>
+            <ac:spMk id="2" creationId="{5E605EE4-1C39-3BC7-2028-29423BF69F98}"/>
+          </ac:spMkLst>
+        </pc:spChg>
+        <pc:spChg chg="mod">
+          <ac:chgData name="bastien CHASSAGNOL" userId="5147dea5b81ac1f3" providerId="LiveId" clId="{DCBE6C67-F851-48B8-80F3-08E8D4311515}" dt="2025-05-07T14:44:22.100" v="2266" actId="207"/>
+          <ac:spMkLst>
+            <pc:docMk/>
+            <pc:sldMk cId="4161119927" sldId="269"/>
+            <ac:spMk id="3" creationId="{7B2DE64D-9BBD-41FC-C7AF-8E9EDB9FAD6F}"/>
+          </ac:spMkLst>
+        </pc:spChg>
+        <pc:spChg chg="add">
+          <ac:chgData name="bastien CHASSAGNOL" userId="5147dea5b81ac1f3" providerId="LiveId" clId="{DCBE6C67-F851-48B8-80F3-08E8D4311515}" dt="2025-05-07T13:43:24.025" v="1809"/>
+          <ac:spMkLst>
+            <pc:docMk/>
+            <pc:sldMk cId="4161119927" sldId="269"/>
+            <ac:spMk id="4" creationId="{142F9A74-7274-BE7A-4823-AAFC5F933973}"/>
+          </ac:spMkLst>
+        </pc:spChg>
+      </pc:sldChg>
+      <pc:sldChg chg="modSp new mod">
+        <pc:chgData name="bastien CHASSAGNOL" userId="5147dea5b81ac1f3" providerId="LiveId" clId="{DCBE6C67-F851-48B8-80F3-08E8D4311515}" dt="2025-05-07T13:42:27.547" v="1781" actId="20577"/>
+        <pc:sldMkLst>
+          <pc:docMk/>
+          <pc:sldMk cId="846846783" sldId="270"/>
+        </pc:sldMkLst>
+        <pc:spChg chg="mod">
+          <ac:chgData name="bastien CHASSAGNOL" userId="5147dea5b81ac1f3" providerId="LiveId" clId="{DCBE6C67-F851-48B8-80F3-08E8D4311515}" dt="2025-05-07T13:41:55.228" v="1650" actId="255"/>
+          <ac:spMkLst>
+            <pc:docMk/>
+            <pc:sldMk cId="846846783" sldId="270"/>
+            <ac:spMk id="2" creationId="{E2A82AE5-B71B-6053-5282-67ADBF0A1919}"/>
+          </ac:spMkLst>
+        </pc:spChg>
+        <pc:spChg chg="mod">
+          <ac:chgData name="bastien CHASSAGNOL" userId="5147dea5b81ac1f3" providerId="LiveId" clId="{DCBE6C67-F851-48B8-80F3-08E8D4311515}" dt="2025-05-07T13:42:27.547" v="1781" actId="20577"/>
+          <ac:spMkLst>
+            <pc:docMk/>
+            <pc:sldMk cId="846846783" sldId="270"/>
+            <ac:spMk id="3" creationId="{07E75E44-F738-D77F-CCD3-F078EE578B5D}"/>
+          </ac:spMkLst>
+        </pc:spChg>
+      </pc:sldChg>
+    </pc:docChg>
+  </pc:docChgLst>
+</pc:chgInfo>
 </file>
 
 <file path=ppt/notesMasters/notesMaster1.xml><?xml version="1.0" encoding="utf-8"?>
@@ -12231,6 +12368,1001 @@
   <p:cSld>
     <p:spTree>
       <p:nvGrpSpPr>
+        <p:cNvPr id="1" name=""/>
+        <p:cNvGrpSpPr/>
+        <p:nvPr/>
+      </p:nvGrpSpPr>
+      <p:grpSpPr>
+        <a:xfrm>
+          <a:off x="0" y="0"/>
+          <a:ext cx="0" cy="0"/>
+          <a:chOff x="0" y="0"/>
+          <a:chExt cx="0" cy="0"/>
+        </a:xfrm>
+      </p:grpSpPr>
+      <p:sp>
+        <p:nvSpPr>
+          <p:cNvPr id="4" name="Title 3">
+            <a:extLst>
+              <a:ext uri="{FF2B5EF4-FFF2-40B4-BE49-F238E27FC236}">
+                <a16:creationId xmlns:a16="http://schemas.microsoft.com/office/drawing/2014/main" id="{8BD1DA16-376F-5852-617D-EE0F8968645B}"/>
+              </a:ext>
+            </a:extLst>
+          </p:cNvPr>
+          <p:cNvSpPr>
+            <a:spLocks noGrp="1"/>
+          </p:cNvSpPr>
+          <p:nvPr>
+            <p:ph type="title"/>
+          </p:nvPr>
+        </p:nvSpPr>
+        <p:spPr>
+          <a:xfrm>
+            <a:off x="156411" y="163178"/>
+            <a:ext cx="8831178" cy="1325563"/>
+          </a:xfrm>
+        </p:spPr>
+        <p:txBody>
+          <a:bodyPr/>
+          <a:lstStyle/>
+          <a:p>
+            <a:r>
+              <a:rPr lang="en-GB" dirty="0"/>
+              <a:t>1) Data management, barcode counts</a:t>
+            </a:r>
+          </a:p>
+        </p:txBody>
+      </p:sp>
+      <p:sp>
+        <p:nvSpPr>
+          <p:cNvPr id="5" name="Text Placeholder 4">
+            <a:extLst>
+              <a:ext uri="{FF2B5EF4-FFF2-40B4-BE49-F238E27FC236}">
+                <a16:creationId xmlns:a16="http://schemas.microsoft.com/office/drawing/2014/main" id="{CE8A50FD-3F56-089F-CB79-F31AE18CD699}"/>
+              </a:ext>
+            </a:extLst>
+          </p:cNvPr>
+          <p:cNvSpPr>
+            <a:spLocks noGrp="1"/>
+          </p:cNvSpPr>
+          <p:nvPr>
+            <p:ph type="body" idx="1"/>
+          </p:nvPr>
+        </p:nvSpPr>
+        <p:spPr>
+          <a:xfrm>
+            <a:off x="-156411" y="1145840"/>
+            <a:ext cx="9144000" cy="5127960"/>
+          </a:xfrm>
+        </p:spPr>
+        <p:txBody>
+          <a:bodyPr>
+            <a:normAutofit fontScale="77500" lnSpcReduction="20000"/>
+          </a:bodyPr>
+          <a:lstStyle/>
+          <a:p>
+            <a:r>
+              <a:rPr lang="en-GB" sz="2000" dirty="0"/>
+              <a:t>Check number of rows (barcode IDs) by number of samples -&gt; why are there so many discrepancies across batches (may not impact the outcome, however, we’re likely to be asked for it by reviewers)</a:t>
+            </a:r>
+          </a:p>
+          <a:p>
+            <a:pPr lvl="1"/>
+            <a:r>
+              <a:rPr lang="en-GB" sz="1600" dirty="0"/>
+              <a:t>In the original </a:t>
+            </a:r>
+            <a:r>
+              <a:rPr lang="en-GB" sz="1200" b="0" i="0" dirty="0">
+                <a:solidFill>
+                  <a:srgbClr val="1F2328"/>
+                </a:solidFill>
+                <a:effectLst/>
+                <a:latin typeface="ui-monospace"/>
+              </a:rPr>
+              <a:t>exp200921.TABULAR file </a:t>
+            </a:r>
+            <a:r>
+              <a:rPr lang="en-GB" sz="2000" b="0" i="0" dirty="0">
+                <a:solidFill>
+                  <a:srgbClr val="1F2328"/>
+                </a:solidFill>
+                <a:effectLst/>
+                <a:latin typeface="ui-monospace"/>
+              </a:rPr>
+              <a:t>provided, 20 replicates were missing: </a:t>
+            </a:r>
+            <a:r>
+              <a:rPr lang="en-GB" sz="1800" dirty="0">
+                <a:effectLst/>
+                <a:latin typeface="Aptos" panose="020B0004020202020204" pitchFamily="34" charset="0"/>
+                <a:ea typeface="Aptos" panose="020B0004020202020204" pitchFamily="34" charset="0"/>
+                <a:cs typeface="Arial" panose="020B0604020202020204" pitchFamily="34" charset="0"/>
+              </a:rPr>
+              <a:t>, replicates times 5 compounds (</a:t>
+            </a:r>
+            <a:r>
+              <a:rPr lang="en-GB" sz="1800" dirty="0" err="1">
+                <a:effectLst/>
+                <a:latin typeface="Aptos" panose="020B0004020202020204" pitchFamily="34" charset="0"/>
+                <a:ea typeface="Aptos" panose="020B0004020202020204" pitchFamily="34" charset="0"/>
+                <a:cs typeface="Arial" panose="020B0604020202020204" pitchFamily="34" charset="0"/>
+              </a:rPr>
+              <a:t>Palboc</a:t>
+            </a:r>
+            <a:r>
+              <a:rPr lang="en-GB" sz="1800" dirty="0">
+                <a:effectLst/>
+                <a:latin typeface="Aptos" panose="020B0004020202020204" pitchFamily="34" charset="0"/>
+                <a:ea typeface="Aptos" panose="020B0004020202020204" pitchFamily="34" charset="0"/>
+                <a:cs typeface="Arial" panose="020B0604020202020204" pitchFamily="34" charset="0"/>
+              </a:rPr>
+              <a:t>, </a:t>
+            </a:r>
+            <a:r>
+              <a:rPr lang="en-GB" sz="1800" dirty="0" err="1">
+                <a:effectLst/>
+                <a:latin typeface="Aptos" panose="020B0004020202020204" pitchFamily="34" charset="0"/>
+                <a:ea typeface="Aptos" panose="020B0004020202020204" pitchFamily="34" charset="0"/>
+                <a:cs typeface="Arial" panose="020B0604020202020204" pitchFamily="34" charset="0"/>
+              </a:rPr>
+              <a:t>Olapar</a:t>
+            </a:r>
+            <a:r>
+              <a:rPr lang="en-GB" sz="1800" dirty="0">
+                <a:effectLst/>
+                <a:latin typeface="Aptos" panose="020B0004020202020204" pitchFamily="34" charset="0"/>
+                <a:ea typeface="Aptos" panose="020B0004020202020204" pitchFamily="34" charset="0"/>
+                <a:cs typeface="Arial" panose="020B0604020202020204" pitchFamily="34" charset="0"/>
+              </a:rPr>
+              <a:t>, LGK9743, </a:t>
+            </a:r>
+            <a:r>
+              <a:rPr lang="en-GB" sz="1800" dirty="0" err="1">
+                <a:effectLst/>
+                <a:latin typeface="Aptos" panose="020B0004020202020204" pitchFamily="34" charset="0"/>
+                <a:ea typeface="Aptos" panose="020B0004020202020204" pitchFamily="34" charset="0"/>
+                <a:cs typeface="Arial" panose="020B0604020202020204" pitchFamily="34" charset="0"/>
+              </a:rPr>
+              <a:t>Chloro</a:t>
+            </a:r>
+            <a:r>
+              <a:rPr lang="en-GB" sz="1800" dirty="0">
+                <a:effectLst/>
+                <a:latin typeface="Aptos" panose="020B0004020202020204" pitchFamily="34" charset="0"/>
+                <a:ea typeface="Aptos" panose="020B0004020202020204" pitchFamily="34" charset="0"/>
+                <a:cs typeface="Arial" panose="020B0604020202020204" pitchFamily="34" charset="0"/>
+              </a:rPr>
+              <a:t>, </a:t>
+            </a:r>
+            <a:r>
+              <a:rPr lang="en-GB" sz="1800" dirty="0" err="1">
+                <a:effectLst/>
+                <a:latin typeface="Aptos" panose="020B0004020202020204" pitchFamily="34" charset="0"/>
+                <a:ea typeface="Aptos" panose="020B0004020202020204" pitchFamily="34" charset="0"/>
+                <a:cs typeface="Arial" panose="020B0604020202020204" pitchFamily="34" charset="0"/>
+              </a:rPr>
+              <a:t>Bafilo</a:t>
+            </a:r>
+            <a:r>
+              <a:rPr lang="en-GB" sz="1800" dirty="0">
+                <a:effectLst/>
+                <a:latin typeface="Aptos" panose="020B0004020202020204" pitchFamily="34" charset="0"/>
+                <a:ea typeface="Aptos" panose="020B0004020202020204" pitchFamily="34" charset="0"/>
+                <a:cs typeface="Arial" panose="020B0604020202020204" pitchFamily="34" charset="0"/>
+              </a:rPr>
+              <a:t>)</a:t>
+            </a:r>
+            <a:endParaRPr lang="en-GB" sz="2000" dirty="0"/>
+          </a:p>
+          <a:p>
+            <a:r>
+              <a:rPr lang="en-GB" sz="2000" dirty="0"/>
+              <a:t>Format:</a:t>
+            </a:r>
+          </a:p>
+          <a:p>
+            <a:pPr lvl="1"/>
+            <a:r>
+              <a:rPr lang="en-GB" sz="1600" dirty="0" err="1"/>
+              <a:t>tsv</a:t>
+            </a:r>
+            <a:r>
+              <a:rPr lang="en-GB" sz="1600" dirty="0"/>
+              <a:t> or true csv (Excel creates some spurious changes to </a:t>
+            </a:r>
+            <a:r>
+              <a:rPr lang="en-GB" sz="1600" dirty="0" err="1"/>
+              <a:t>colnames</a:t>
+            </a:r>
+            <a:r>
+              <a:rPr lang="en-GB" sz="1600" dirty="0"/>
+              <a:t> + random clipping of large files)</a:t>
+            </a:r>
+          </a:p>
+          <a:p>
+            <a:pPr lvl="1"/>
+            <a:r>
+              <a:rPr lang="en-GB" sz="1600" dirty="0"/>
+              <a:t>(optional): </a:t>
+            </a:r>
+            <a:r>
+              <a:rPr lang="en-GB" sz="1600" dirty="0" err="1"/>
+              <a:t>DuckDB</a:t>
+            </a:r>
+            <a:r>
+              <a:rPr lang="en-GB" sz="1600" dirty="0"/>
+              <a:t> or Parquet local database for efficient exploration</a:t>
+            </a:r>
+          </a:p>
+          <a:p>
+            <a:r>
+              <a:rPr lang="en-GB" sz="2000" dirty="0"/>
+              <a:t>So far, I fully discard:</a:t>
+            </a:r>
+            <a:endParaRPr lang="en-GB" sz="1600" dirty="0"/>
+          </a:p>
+          <a:p>
+            <a:pPr lvl="1"/>
+            <a:r>
+              <a:rPr lang="en-GB" sz="1600" dirty="0">
+                <a:latin typeface="Courier New" panose="02070309020205020404" pitchFamily="49" charset="0"/>
+                <a:cs typeface="Courier New" panose="02070309020205020404" pitchFamily="49" charset="0"/>
+              </a:rPr>
+              <a:t>exp130921 in vivo </a:t>
+            </a:r>
+            <a:r>
+              <a:rPr lang="en-GB" sz="1600" dirty="0">
+                <a:latin typeface="Calibri" panose="020F0502020204030204" pitchFamily="34" charset="0"/>
+                <a:ea typeface="Calibri" panose="020F0502020204030204" pitchFamily="34" charset="0"/>
+                <a:cs typeface="Calibri" panose="020F0502020204030204" pitchFamily="34" charset="0"/>
+              </a:rPr>
+              <a:t>replicates</a:t>
+            </a:r>
+          </a:p>
+          <a:p>
+            <a:pPr lvl="1"/>
+            <a:r>
+              <a:rPr lang="en-GB" sz="1600" dirty="0">
+                <a:latin typeface="Calibri" panose="020F0502020204030204" pitchFamily="34" charset="0"/>
+                <a:ea typeface="Calibri" panose="020F0502020204030204" pitchFamily="34" charset="0"/>
+                <a:cs typeface="Calibri" panose="020F0502020204030204" pitchFamily="34" charset="0"/>
+              </a:rPr>
+              <a:t>All T25 experiences: </a:t>
+            </a:r>
+            <a:r>
+              <a:rPr lang="en-GB" sz="1200" b="0" i="0" dirty="0">
+                <a:solidFill>
+                  <a:srgbClr val="1F2328"/>
+                </a:solidFill>
+                <a:effectLst/>
+                <a:latin typeface="-apple-system"/>
+              </a:rPr>
+              <a:t>CTRL1_000u_exp281022_T25_run141222_06; PROTAC1_010u_exp281022_T25_run141222_10; Cetux1_020u_exp281022_T25_run141222_14; Gef1_002u_exp281022_T25_run141222_18. </a:t>
+            </a:r>
+            <a:r>
+              <a:rPr lang="en-GB" sz="1600" dirty="0">
+                <a:solidFill>
+                  <a:srgbClr val="1F2328"/>
+                </a:solidFill>
+                <a:latin typeface="Calibri" panose="020F0502020204030204" pitchFamily="34" charset="0"/>
+                <a:ea typeface="Calibri" panose="020F0502020204030204" pitchFamily="34" charset="0"/>
+                <a:cs typeface="Calibri" panose="020F0502020204030204" pitchFamily="34" charset="0"/>
+              </a:rPr>
+              <a:t>What’s meaning of T25?</a:t>
+            </a:r>
+          </a:p>
+          <a:p>
+            <a:pPr lvl="1"/>
+            <a:r>
+              <a:rPr lang="en-GB" sz="1200" b="0" i="0" dirty="0">
+                <a:solidFill>
+                  <a:srgbClr val="1F2328"/>
+                </a:solidFill>
+                <a:effectLst/>
+                <a:latin typeface="-apple-system"/>
+              </a:rPr>
+              <a:t>p42 and p43</a:t>
+            </a:r>
+          </a:p>
+          <a:p>
+            <a:pPr lvl="1"/>
+            <a:r>
+              <a:rPr lang="en-GB" sz="1600" dirty="0" err="1">
+                <a:solidFill>
+                  <a:srgbClr val="1F2328"/>
+                </a:solidFill>
+                <a:latin typeface="Calibri" panose="020F0502020204030204" pitchFamily="34" charset="0"/>
+                <a:ea typeface="Calibri" panose="020F0502020204030204" pitchFamily="34" charset="0"/>
+                <a:cs typeface="Calibri" panose="020F0502020204030204" pitchFamily="34" charset="0"/>
+              </a:rPr>
+              <a:t>sorafetinib</a:t>
+            </a:r>
+            <a:r>
+              <a:rPr lang="en-GB" sz="1600" dirty="0">
+                <a:solidFill>
+                  <a:srgbClr val="1F2328"/>
+                </a:solidFill>
+                <a:latin typeface="Calibri" panose="020F0502020204030204" pitchFamily="34" charset="0"/>
+                <a:ea typeface="Calibri" panose="020F0502020204030204" pitchFamily="34" charset="0"/>
+                <a:cs typeface="Calibri" panose="020F0502020204030204" pitchFamily="34" charset="0"/>
+              </a:rPr>
+              <a:t> with 3 replicates, concentration 5 </a:t>
+            </a:r>
+            <a:r>
+              <a:rPr lang="en-GB" sz="1600" dirty="0" err="1">
+                <a:solidFill>
+                  <a:srgbClr val="1F2328"/>
+                </a:solidFill>
+                <a:latin typeface="Calibri" panose="020F0502020204030204" pitchFamily="34" charset="0"/>
+                <a:ea typeface="Calibri" panose="020F0502020204030204" pitchFamily="34" charset="0"/>
+                <a:cs typeface="Calibri" panose="020F0502020204030204" pitchFamily="34" charset="0"/>
+              </a:rPr>
+              <a:t>uM</a:t>
+            </a:r>
+            <a:r>
+              <a:rPr lang="en-GB" sz="1600" dirty="0">
+                <a:solidFill>
+                  <a:srgbClr val="1F2328"/>
+                </a:solidFill>
+                <a:latin typeface="Calibri" panose="020F0502020204030204" pitchFamily="34" charset="0"/>
+                <a:ea typeface="Calibri" panose="020F0502020204030204" pitchFamily="34" charset="0"/>
+                <a:cs typeface="Calibri" panose="020F0502020204030204" pitchFamily="34" charset="0"/>
+              </a:rPr>
+              <a:t>, date 300821, reported originally on Table of compounds, was discarded, as not found in the provided barcode counts -&gt; normal to be discarded</a:t>
+            </a:r>
+          </a:p>
+          <a:p>
+            <a:pPr lvl="1"/>
+            <a:r>
+              <a:rPr lang="en-GB" sz="1600" dirty="0">
+                <a:solidFill>
+                  <a:srgbClr val="1F2328"/>
+                </a:solidFill>
+                <a:latin typeface="Calibri" panose="020F0502020204030204" pitchFamily="34" charset="0"/>
+                <a:ea typeface="Calibri" panose="020F0502020204030204" pitchFamily="34" charset="0"/>
+                <a:cs typeface="Calibri" panose="020F0502020204030204" pitchFamily="34" charset="0"/>
+              </a:rPr>
+              <a:t>Either we do not talk at all about early discarded replicates, or we show by proper visualisations or statistical testing that they are strong outliers.</a:t>
+            </a:r>
+          </a:p>
+          <a:p>
+            <a:pPr lvl="1"/>
+            <a:endParaRPr lang="en-GB" sz="1600" dirty="0">
+              <a:solidFill>
+                <a:srgbClr val="1F2328"/>
+              </a:solidFill>
+              <a:latin typeface="Calibri" panose="020F0502020204030204" pitchFamily="34" charset="0"/>
+              <a:ea typeface="Calibri" panose="020F0502020204030204" pitchFamily="34" charset="0"/>
+              <a:cs typeface="Calibri" panose="020F0502020204030204" pitchFamily="34" charset="0"/>
+            </a:endParaRPr>
+          </a:p>
+          <a:p>
+            <a:r>
+              <a:rPr lang="en-GB" sz="2000" dirty="0">
+                <a:solidFill>
+                  <a:srgbClr val="1F2328"/>
+                </a:solidFill>
+                <a:latin typeface="Calibri" panose="020F0502020204030204" pitchFamily="34" charset="0"/>
+                <a:ea typeface="Calibri" panose="020F0502020204030204" pitchFamily="34" charset="0"/>
+                <a:cs typeface="Calibri" panose="020F0502020204030204" pitchFamily="34" charset="0"/>
+              </a:rPr>
+              <a:t>I kept:</a:t>
+            </a:r>
+          </a:p>
+          <a:p>
+            <a:pPr lvl="1"/>
+            <a:r>
+              <a:rPr lang="en-GB" sz="1600" dirty="0">
+                <a:solidFill>
+                  <a:srgbClr val="1F2328"/>
+                </a:solidFill>
+                <a:latin typeface="Calibri" panose="020F0502020204030204" pitchFamily="34" charset="0"/>
+                <a:ea typeface="Calibri" panose="020F0502020204030204" pitchFamily="34" charset="0"/>
+                <a:cs typeface="Calibri" panose="020F0502020204030204" pitchFamily="34" charset="0"/>
+              </a:rPr>
+              <a:t>Time course experiences</a:t>
+            </a:r>
+          </a:p>
+          <a:p>
+            <a:pPr lvl="1"/>
+            <a:r>
+              <a:rPr lang="en-GB" sz="1600" dirty="0">
+                <a:solidFill>
+                  <a:srgbClr val="1F2328"/>
+                </a:solidFill>
+                <a:latin typeface="Calibri" panose="020F0502020204030204" pitchFamily="34" charset="0"/>
+                <a:ea typeface="Calibri" panose="020F0502020204030204" pitchFamily="34" charset="0"/>
+                <a:cs typeface="Calibri" panose="020F0502020204030204" pitchFamily="34" charset="0"/>
+              </a:rPr>
+              <a:t>Dose response</a:t>
+            </a:r>
+          </a:p>
+          <a:p>
+            <a:pPr lvl="1"/>
+            <a:r>
+              <a:rPr lang="en-GB" sz="1600" dirty="0">
+                <a:solidFill>
+                  <a:srgbClr val="1F2328"/>
+                </a:solidFill>
+                <a:latin typeface="Calibri" panose="020F0502020204030204" pitchFamily="34" charset="0"/>
+                <a:ea typeface="Calibri" panose="020F0502020204030204" pitchFamily="34" charset="0"/>
+                <a:cs typeface="Calibri" panose="020F0502020204030204" pitchFamily="34" charset="0"/>
+              </a:rPr>
+              <a:t>Drug combination: </a:t>
+            </a:r>
+            <a:r>
+              <a:rPr lang="en-GB" sz="1200" b="0" i="0" dirty="0" err="1">
+                <a:solidFill>
+                  <a:srgbClr val="1F2328"/>
+                </a:solidFill>
+                <a:effectLst/>
+                <a:latin typeface="ui-monospace"/>
+              </a:rPr>
+              <a:t>Osimertinb+sorafenib</a:t>
+            </a:r>
+            <a:r>
+              <a:rPr lang="en-GB" sz="1200" b="0" i="0" dirty="0">
+                <a:solidFill>
+                  <a:srgbClr val="1F2328"/>
+                </a:solidFill>
+                <a:effectLst/>
+                <a:latin typeface="ui-monospace"/>
+              </a:rPr>
+              <a:t> -&gt; to be ^paired with </a:t>
+            </a:r>
+            <a:r>
+              <a:rPr lang="en-GB" sz="1200" b="0" i="0" dirty="0" err="1">
+                <a:solidFill>
+                  <a:srgbClr val="1F2328"/>
+                </a:solidFill>
+                <a:effectLst/>
+                <a:latin typeface="ui-monospace"/>
+              </a:rPr>
+              <a:t>osi</a:t>
+            </a:r>
+            <a:r>
+              <a:rPr lang="en-GB" sz="1200" b="0" i="0" dirty="0">
+                <a:solidFill>
+                  <a:srgbClr val="1F2328"/>
+                </a:solidFill>
+                <a:effectLst/>
+                <a:latin typeface="ui-monospace"/>
+              </a:rPr>
+              <a:t> and sora alone.</a:t>
+            </a:r>
+          </a:p>
+          <a:p>
+            <a:pPr lvl="1"/>
+            <a:r>
+              <a:rPr lang="en-GB" sz="1500" dirty="0">
+                <a:solidFill>
+                  <a:srgbClr val="1F2328"/>
+                </a:solidFill>
+                <a:latin typeface="ui-monospace"/>
+                <a:ea typeface="Calibri" panose="020F0502020204030204" pitchFamily="34" charset="0"/>
+                <a:cs typeface="Calibri" panose="020F0502020204030204" pitchFamily="34" charset="0"/>
+              </a:rPr>
+              <a:t>Would like to evaluate the impact of keeping only the most frequent </a:t>
+            </a:r>
+            <a:r>
+              <a:rPr lang="en-GB" sz="1500" dirty="0" err="1">
+                <a:solidFill>
+                  <a:srgbClr val="1F2328"/>
+                </a:solidFill>
+                <a:latin typeface="ui-monospace"/>
+                <a:ea typeface="Calibri" panose="020F0502020204030204" pitchFamily="34" charset="0"/>
+                <a:cs typeface="Calibri" panose="020F0502020204030204" pitchFamily="34" charset="0"/>
+              </a:rPr>
+              <a:t>Osimertinb</a:t>
+            </a:r>
+            <a:r>
+              <a:rPr lang="en-GB" sz="1500" dirty="0">
+                <a:solidFill>
+                  <a:srgbClr val="1F2328"/>
+                </a:solidFill>
+                <a:latin typeface="ui-monospace"/>
+                <a:ea typeface="Calibri" panose="020F0502020204030204" pitchFamily="34" charset="0"/>
+                <a:cs typeface="Calibri" panose="020F0502020204030204" pitchFamily="34" charset="0"/>
+              </a:rPr>
+              <a:t> concentrations across all replicates, or the drug concentration which has the most effect (+ from time courses, only keep the one after 9 days) </a:t>
+            </a:r>
+            <a:endParaRPr lang="en-GB" sz="1500" dirty="0">
+              <a:solidFill>
+                <a:srgbClr val="1F2328"/>
+              </a:solidFill>
+              <a:latin typeface="Calibri" panose="020F0502020204030204" pitchFamily="34" charset="0"/>
+              <a:ea typeface="Calibri" panose="020F0502020204030204" pitchFamily="34" charset="0"/>
+              <a:cs typeface="Calibri" panose="020F0502020204030204" pitchFamily="34" charset="0"/>
+            </a:endParaRPr>
+          </a:p>
+          <a:p>
+            <a:endParaRPr lang="en-GB" sz="2000" dirty="0">
+              <a:solidFill>
+                <a:srgbClr val="1F2328"/>
+              </a:solidFill>
+              <a:latin typeface="Calibri" panose="020F0502020204030204" pitchFamily="34" charset="0"/>
+              <a:ea typeface="Calibri" panose="020F0502020204030204" pitchFamily="34" charset="0"/>
+              <a:cs typeface="Calibri" panose="020F0502020204030204" pitchFamily="34" charset="0"/>
+            </a:endParaRPr>
+          </a:p>
+          <a:p>
+            <a:pPr lvl="1"/>
+            <a:endParaRPr lang="en-GB" sz="1600" dirty="0">
+              <a:solidFill>
+                <a:srgbClr val="1F2328"/>
+              </a:solidFill>
+              <a:latin typeface="Calibri" panose="020F0502020204030204" pitchFamily="34" charset="0"/>
+              <a:ea typeface="Calibri" panose="020F0502020204030204" pitchFamily="34" charset="0"/>
+              <a:cs typeface="Calibri" panose="020F0502020204030204" pitchFamily="34" charset="0"/>
+            </a:endParaRPr>
+          </a:p>
+          <a:p>
+            <a:pPr lvl="1"/>
+            <a:endParaRPr lang="en-GB" sz="1600" dirty="0">
+              <a:latin typeface="Courier New" panose="02070309020205020404" pitchFamily="49" charset="0"/>
+              <a:cs typeface="Courier New" panose="02070309020205020404" pitchFamily="49" charset="0"/>
+            </a:endParaRPr>
+          </a:p>
+          <a:p>
+            <a:pPr lvl="1"/>
+            <a:endParaRPr lang="en-GB" sz="1600" dirty="0"/>
+          </a:p>
+        </p:txBody>
+      </p:sp>
+    </p:spTree>
+    <p:extLst>
+      <p:ext uri="{BB962C8B-B14F-4D97-AF65-F5344CB8AC3E}">
+        <p14:creationId xmlns:p14="http://schemas.microsoft.com/office/powerpoint/2010/main" val="170907872"/>
+      </p:ext>
+    </p:extLst>
+  </p:cSld>
+  <p:clrMapOvr>
+    <a:masterClrMapping/>
+  </p:clrMapOvr>
+</p:sld>
+</file>
+
+<file path=ppt/slides/slide11.xml><?xml version="1.0" encoding="utf-8"?>
+<p:sld xmlns:a="http://schemas.openxmlformats.org/drawingml/2006/main" xmlns:r="http://schemas.openxmlformats.org/officeDocument/2006/relationships" xmlns:p="http://schemas.openxmlformats.org/presentationml/2006/main">
+  <p:cSld>
+    <p:spTree>
+      <p:nvGrpSpPr>
+        <p:cNvPr id="1" name=""/>
+        <p:cNvGrpSpPr/>
+        <p:nvPr/>
+      </p:nvGrpSpPr>
+      <p:grpSpPr>
+        <a:xfrm>
+          <a:off x="0" y="0"/>
+          <a:ext cx="0" cy="0"/>
+          <a:chOff x="0" y="0"/>
+          <a:chExt cx="0" cy="0"/>
+        </a:xfrm>
+      </p:grpSpPr>
+      <p:sp>
+        <p:nvSpPr>
+          <p:cNvPr id="2" name="Title 1">
+            <a:extLst>
+              <a:ext uri="{FF2B5EF4-FFF2-40B4-BE49-F238E27FC236}">
+                <a16:creationId xmlns:a16="http://schemas.microsoft.com/office/drawing/2014/main" id="{5E605EE4-1C39-3BC7-2028-29423BF69F98}"/>
+              </a:ext>
+            </a:extLst>
+          </p:cNvPr>
+          <p:cNvSpPr>
+            <a:spLocks noGrp="1"/>
+          </p:cNvSpPr>
+          <p:nvPr>
+            <p:ph type="title"/>
+          </p:nvPr>
+        </p:nvSpPr>
+        <p:spPr>
+          <a:xfrm>
+            <a:off x="177800" y="365126"/>
+            <a:ext cx="8337550" cy="1325563"/>
+          </a:xfrm>
+        </p:spPr>
+        <p:txBody>
+          <a:bodyPr>
+            <a:normAutofit/>
+          </a:bodyPr>
+          <a:lstStyle/>
+          <a:p>
+            <a:r>
+              <a:rPr lang="en-GB" sz="3600" dirty="0"/>
+              <a:t>2) Data management, phenotype metadata</a:t>
+            </a:r>
+          </a:p>
+        </p:txBody>
+      </p:sp>
+      <p:sp>
+        <p:nvSpPr>
+          <p:cNvPr id="3" name="Text Placeholder 2">
+            <a:extLst>
+              <a:ext uri="{FF2B5EF4-FFF2-40B4-BE49-F238E27FC236}">
+                <a16:creationId xmlns:a16="http://schemas.microsoft.com/office/drawing/2014/main" id="{7B2DE64D-9BBD-41FC-C7AF-8E9EDB9FAD6F}"/>
+              </a:ext>
+            </a:extLst>
+          </p:cNvPr>
+          <p:cNvSpPr>
+            <a:spLocks noGrp="1"/>
+          </p:cNvSpPr>
+          <p:nvPr>
+            <p:ph type="body" idx="1"/>
+          </p:nvPr>
+        </p:nvSpPr>
+        <p:spPr>
+          <a:xfrm>
+            <a:off x="177800" y="1253331"/>
+            <a:ext cx="8337550" cy="4351338"/>
+          </a:xfrm>
+        </p:spPr>
+        <p:txBody>
+          <a:bodyPr>
+            <a:normAutofit lnSpcReduction="10000"/>
+          </a:bodyPr>
+          <a:lstStyle/>
+          <a:p>
+            <a:r>
+              <a:rPr lang="en-GB" dirty="0"/>
+              <a:t>PEM prefix stands for </a:t>
+            </a:r>
+            <a:r>
+              <a:rPr lang="en-GB" sz="1800" dirty="0">
+                <a:effectLst/>
+                <a:latin typeface="Aptos" panose="020B0004020202020204" pitchFamily="34" charset="0"/>
+                <a:ea typeface="Aptos" panose="020B0004020202020204" pitchFamily="34" charset="0"/>
+                <a:cs typeface="Arial" panose="020B0604020202020204" pitchFamily="34" charset="0"/>
+              </a:rPr>
+              <a:t>Pemetrexed in time course experiences, right? (elsewhere `</a:t>
+            </a:r>
+            <a:r>
+              <a:rPr lang="en-GB" sz="1800" dirty="0" err="1">
+                <a:effectLst/>
+                <a:latin typeface="Aptos" panose="020B0004020202020204" pitchFamily="34" charset="0"/>
+                <a:ea typeface="Aptos" panose="020B0004020202020204" pitchFamily="34" charset="0"/>
+                <a:cs typeface="Arial" panose="020B0604020202020204" pitchFamily="34" charset="0"/>
+              </a:rPr>
+              <a:t>Pemetr</a:t>
+            </a:r>
+            <a:r>
+              <a:rPr lang="en-GB" sz="1800" dirty="0">
+                <a:effectLst/>
+                <a:latin typeface="Aptos" panose="020B0004020202020204" pitchFamily="34" charset="0"/>
+                <a:ea typeface="Aptos" panose="020B0004020202020204" pitchFamily="34" charset="0"/>
+                <a:cs typeface="Arial" panose="020B0604020202020204" pitchFamily="34" charset="0"/>
+              </a:rPr>
+              <a:t>`)</a:t>
+            </a:r>
+          </a:p>
+          <a:p>
+            <a:r>
+              <a:rPr lang="en-GB" sz="1800" dirty="0">
+                <a:latin typeface="Aptos" panose="020B0004020202020204" pitchFamily="34" charset="0"/>
+                <a:ea typeface="Aptos" panose="020B0004020202020204" pitchFamily="34" charset="0"/>
+                <a:cs typeface="Arial" panose="020B0604020202020204" pitchFamily="34" charset="0"/>
+              </a:rPr>
+              <a:t>Format </a:t>
+            </a:r>
+            <a:r>
+              <a:rPr lang="en-GB" sz="1800" dirty="0">
+                <a:solidFill>
+                  <a:srgbClr val="FF0000"/>
+                </a:solidFill>
+                <a:latin typeface="Aptos" panose="020B0004020202020204" pitchFamily="34" charset="0"/>
+                <a:ea typeface="Aptos" panose="020B0004020202020204" pitchFamily="34" charset="0"/>
+                <a:cs typeface="Arial" panose="020B0604020202020204" pitchFamily="34" charset="0"/>
+              </a:rPr>
+              <a:t>concentrations to moles (some were in moles</a:t>
+            </a:r>
+            <a:r>
+              <a:rPr lang="en-GB" sz="1800" dirty="0">
+                <a:latin typeface="Aptos" panose="020B0004020202020204" pitchFamily="34" charset="0"/>
+                <a:ea typeface="Aptos" panose="020B0004020202020204" pitchFamily="34" charset="0"/>
+                <a:cs typeface="Arial" panose="020B0604020202020204" pitchFamily="34" charset="0"/>
+              </a:rPr>
+              <a:t>, others in grams?), dates to ISO (year-month-day) and Duration to days, assuming months of 30 days. </a:t>
+            </a:r>
+          </a:p>
+          <a:p>
+            <a:r>
+              <a:rPr lang="en-GB" sz="1800" dirty="0">
+                <a:effectLst/>
+                <a:latin typeface="Aptos" panose="020B0004020202020204" pitchFamily="34" charset="0"/>
+                <a:ea typeface="Aptos" panose="020B0004020202020204" pitchFamily="34" charset="0"/>
+                <a:cs typeface="Arial" panose="020B0604020202020204" pitchFamily="34" charset="0"/>
+              </a:rPr>
+              <a:t>Map on the same table the replicates’ columns with their respective general features and original Compound names.</a:t>
+            </a:r>
+          </a:p>
+          <a:p>
+            <a:r>
+              <a:rPr lang="en-GB" sz="1800" dirty="0">
+                <a:latin typeface="Aptos" panose="020B0004020202020204" pitchFamily="34" charset="0"/>
+                <a:ea typeface="Aptos" panose="020B0004020202020204" pitchFamily="34" charset="0"/>
+                <a:cs typeface="Arial" panose="020B0604020202020204" pitchFamily="34" charset="0"/>
+              </a:rPr>
+              <a:t>Could we consider Time Course along with more classical experiments of </a:t>
+            </a:r>
+            <a:r>
+              <a:rPr lang="en-GB" sz="1200" b="0" i="0" dirty="0">
+                <a:solidFill>
+                  <a:srgbClr val="1F2328"/>
+                </a:solidFill>
+                <a:effectLst/>
+                <a:latin typeface="ui-monospace"/>
+              </a:rPr>
+              <a:t>exp200921 as the same batch? Important for statistical analyses.</a:t>
+            </a:r>
+          </a:p>
+          <a:p>
+            <a:r>
+              <a:rPr lang="en-GB" sz="1800" dirty="0">
+                <a:effectLst/>
+                <a:latin typeface="Aptos" panose="020B0004020202020204" pitchFamily="34" charset="0"/>
+                <a:ea typeface="Aptos" panose="020B0004020202020204" pitchFamily="34" charset="0"/>
+                <a:cs typeface="Arial" panose="020B0604020202020204" pitchFamily="34" charset="0"/>
+              </a:rPr>
+              <a:t>Final, consensual </a:t>
+            </a:r>
+            <a:r>
+              <a:rPr lang="en-GB" sz="1800" dirty="0" err="1">
+                <a:effectLst/>
+                <a:latin typeface="Aptos" panose="020B0004020202020204" pitchFamily="34" charset="0"/>
+                <a:ea typeface="Aptos" panose="020B0004020202020204" pitchFamily="34" charset="0"/>
+                <a:cs typeface="Arial" panose="020B0604020202020204" pitchFamily="34" charset="0"/>
+              </a:rPr>
+              <a:t>pheno</a:t>
+            </a:r>
+            <a:r>
+              <a:rPr lang="en-GB" sz="1800" dirty="0">
+                <a:effectLst/>
+                <a:latin typeface="Aptos" panose="020B0004020202020204" pitchFamily="34" charset="0"/>
+                <a:ea typeface="Aptos" panose="020B0004020202020204" pitchFamily="34" charset="0"/>
+                <a:cs typeface="Arial" panose="020B0604020202020204" pitchFamily="34" charset="0"/>
+              </a:rPr>
+              <a:t> </a:t>
+            </a:r>
+            <a:r>
+              <a:rPr lang="en-GB" sz="1800" dirty="0" err="1">
+                <a:effectLst/>
+                <a:latin typeface="Aptos" panose="020B0004020202020204" pitchFamily="34" charset="0"/>
+                <a:ea typeface="Aptos" panose="020B0004020202020204" pitchFamily="34" charset="0"/>
+                <a:cs typeface="Arial" panose="020B0604020202020204" pitchFamily="34" charset="0"/>
+              </a:rPr>
+              <a:t>colnames</a:t>
+            </a:r>
+            <a:r>
+              <a:rPr lang="en-GB" sz="1800" dirty="0">
+                <a:effectLst/>
+                <a:latin typeface="Aptos" panose="020B0004020202020204" pitchFamily="34" charset="0"/>
+                <a:ea typeface="Aptos" panose="020B0004020202020204" pitchFamily="34" charset="0"/>
+                <a:cs typeface="Arial" panose="020B0604020202020204" pitchFamily="34" charset="0"/>
+              </a:rPr>
+              <a:t> to be drawn from </a:t>
+            </a:r>
+            <a:r>
+              <a:rPr lang="en-GB" sz="1800" dirty="0" err="1">
+                <a:effectLst/>
+                <a:latin typeface="Aptos" panose="020B0004020202020204" pitchFamily="34" charset="0"/>
+                <a:ea typeface="Aptos" panose="020B0004020202020204" pitchFamily="34" charset="0"/>
+                <a:cs typeface="Arial" panose="020B0604020202020204" pitchFamily="34" charset="0"/>
+              </a:rPr>
+              <a:t>Bgee</a:t>
+            </a:r>
+            <a:r>
+              <a:rPr lang="en-GB" sz="1800" dirty="0">
+                <a:effectLst/>
+                <a:latin typeface="Aptos" panose="020B0004020202020204" pitchFamily="34" charset="0"/>
+                <a:ea typeface="Aptos" panose="020B0004020202020204" pitchFamily="34" charset="0"/>
+                <a:cs typeface="Arial" panose="020B0604020202020204" pitchFamily="34" charset="0"/>
+              </a:rPr>
+              <a:t>/</a:t>
+            </a:r>
+            <a:r>
+              <a:rPr lang="en-GB" sz="1800" dirty="0" err="1">
+                <a:effectLst/>
+                <a:latin typeface="Aptos" panose="020B0004020202020204" pitchFamily="34" charset="0"/>
+                <a:ea typeface="Aptos" panose="020B0004020202020204" pitchFamily="34" charset="0"/>
+                <a:cs typeface="Arial" panose="020B0604020202020204" pitchFamily="34" charset="0"/>
+              </a:rPr>
+              <a:t>Cellosorus</a:t>
+            </a:r>
+            <a:r>
+              <a:rPr lang="en-GB" sz="1800" dirty="0">
+                <a:effectLst/>
+                <a:latin typeface="Aptos" panose="020B0004020202020204" pitchFamily="34" charset="0"/>
+                <a:ea typeface="Aptos" panose="020B0004020202020204" pitchFamily="34" charset="0"/>
+                <a:cs typeface="Arial" panose="020B0604020202020204" pitchFamily="34" charset="0"/>
+              </a:rPr>
+              <a:t>? </a:t>
+            </a:r>
+          </a:p>
+          <a:p>
+            <a:r>
+              <a:rPr lang="en-GB" sz="1800" dirty="0">
+                <a:latin typeface="Aptos" panose="020B0004020202020204" pitchFamily="34" charset="0"/>
+                <a:ea typeface="Aptos" panose="020B0004020202020204" pitchFamily="34" charset="0"/>
+                <a:cs typeface="Arial" panose="020B0604020202020204" pitchFamily="34" charset="0"/>
+              </a:rPr>
+              <a:t>Spotted inconsistencies:</a:t>
+            </a:r>
+          </a:p>
+          <a:p>
+            <a:pPr lvl="1"/>
+            <a:r>
+              <a:rPr lang="en-GB" sz="1400" dirty="0">
+                <a:effectLst/>
+                <a:latin typeface="Aptos" panose="020B0004020202020204" pitchFamily="34" charset="0"/>
+                <a:ea typeface="Aptos" panose="020B0004020202020204" pitchFamily="34" charset="0"/>
+                <a:cs typeface="Arial" panose="020B0604020202020204" pitchFamily="34" charset="0"/>
+              </a:rPr>
+              <a:t>XAV-939, derived from batch exp220322, is reported with 4 replicates in the original Table of compounds.xlsx metadata file, while only 2 could be found in exp220322 barcode count matrix. </a:t>
+            </a:r>
+            <a:endParaRPr lang="en-GB" sz="1400" dirty="0">
+              <a:latin typeface="Aptos" panose="020B0004020202020204" pitchFamily="34" charset="0"/>
+              <a:ea typeface="Aptos" panose="020B0004020202020204" pitchFamily="34" charset="0"/>
+              <a:cs typeface="Arial" panose="020B0604020202020204" pitchFamily="34" charset="0"/>
+            </a:endParaRPr>
+          </a:p>
+          <a:p>
+            <a:pPr lvl="1"/>
+            <a:r>
+              <a:rPr lang="en-GB" sz="1400" dirty="0">
+                <a:effectLst/>
+                <a:latin typeface="Aptos" panose="020B0004020202020204" pitchFamily="34" charset="0"/>
+                <a:ea typeface="Aptos" panose="020B0004020202020204" pitchFamily="34" charset="0"/>
+                <a:cs typeface="Arial" panose="020B0604020202020204" pitchFamily="34" charset="0"/>
+              </a:rPr>
+              <a:t>Discarded all Control – Time Zero experiences, as none could be found in barcode experiments</a:t>
+            </a:r>
+          </a:p>
+          <a:p>
+            <a:endParaRPr lang="en-GB" dirty="0"/>
+          </a:p>
+        </p:txBody>
+      </p:sp>
+    </p:spTree>
+    <p:extLst>
+      <p:ext uri="{BB962C8B-B14F-4D97-AF65-F5344CB8AC3E}">
+        <p14:creationId xmlns:p14="http://schemas.microsoft.com/office/powerpoint/2010/main" val="4161119927"/>
+      </p:ext>
+    </p:extLst>
+  </p:cSld>
+  <p:clrMapOvr>
+    <a:masterClrMapping/>
+  </p:clrMapOvr>
+</p:sld>
+</file>
+
+<file path=ppt/slides/slide12.xml><?xml version="1.0" encoding="utf-8"?>
+<p:sld xmlns:a="http://schemas.openxmlformats.org/drawingml/2006/main" xmlns:r="http://schemas.openxmlformats.org/officeDocument/2006/relationships" xmlns:p="http://schemas.openxmlformats.org/presentationml/2006/main">
+  <p:cSld>
+    <p:spTree>
+      <p:nvGrpSpPr>
+        <p:cNvPr id="1" name=""/>
+        <p:cNvGrpSpPr/>
+        <p:nvPr/>
+      </p:nvGrpSpPr>
+      <p:grpSpPr>
+        <a:xfrm>
+          <a:off x="0" y="0"/>
+          <a:ext cx="0" cy="0"/>
+          <a:chOff x="0" y="0"/>
+          <a:chExt cx="0" cy="0"/>
+        </a:xfrm>
+      </p:grpSpPr>
+      <p:sp>
+        <p:nvSpPr>
+          <p:cNvPr id="2" name="Title 1">
+            <a:extLst>
+              <a:ext uri="{FF2B5EF4-FFF2-40B4-BE49-F238E27FC236}">
+                <a16:creationId xmlns:a16="http://schemas.microsoft.com/office/drawing/2014/main" id="{E2A82AE5-B71B-6053-5282-67ADBF0A1919}"/>
+              </a:ext>
+            </a:extLst>
+          </p:cNvPr>
+          <p:cNvSpPr>
+            <a:spLocks noGrp="1"/>
+          </p:cNvSpPr>
+          <p:nvPr>
+            <p:ph type="title"/>
+          </p:nvPr>
+        </p:nvSpPr>
+        <p:spPr>
+          <a:xfrm>
+            <a:off x="0" y="365126"/>
+            <a:ext cx="9461500" cy="1325563"/>
+          </a:xfrm>
+        </p:spPr>
+        <p:txBody>
+          <a:bodyPr>
+            <a:normAutofit/>
+          </a:bodyPr>
+          <a:lstStyle/>
+          <a:p>
+            <a:r>
+              <a:rPr lang="en-GB" sz="4000" b="1" dirty="0"/>
+              <a:t>3</a:t>
+            </a:r>
+            <a:r>
+              <a:rPr lang="en-GB" sz="3600" b="1" dirty="0"/>
+              <a:t>) Data management, SummarizdExperiment</a:t>
+            </a:r>
+          </a:p>
+        </p:txBody>
+      </p:sp>
+      <p:sp>
+        <p:nvSpPr>
+          <p:cNvPr id="3" name="Text Placeholder 2">
+            <a:extLst>
+              <a:ext uri="{FF2B5EF4-FFF2-40B4-BE49-F238E27FC236}">
+                <a16:creationId xmlns:a16="http://schemas.microsoft.com/office/drawing/2014/main" id="{07E75E44-F738-D77F-CCD3-F078EE578B5D}"/>
+              </a:ext>
+            </a:extLst>
+          </p:cNvPr>
+          <p:cNvSpPr>
+            <a:spLocks noGrp="1"/>
+          </p:cNvSpPr>
+          <p:nvPr>
+            <p:ph type="body" idx="1"/>
+          </p:nvPr>
+        </p:nvSpPr>
+        <p:spPr>
+          <a:xfrm>
+            <a:off x="114300" y="1825625"/>
+            <a:ext cx="8401050" cy="4351338"/>
+          </a:xfrm>
+        </p:spPr>
+        <p:txBody>
+          <a:bodyPr/>
+          <a:lstStyle/>
+          <a:p>
+            <a:r>
+              <a:rPr lang="en-GB" dirty="0"/>
+              <a:t>Save in the same object:</a:t>
+            </a:r>
+          </a:p>
+          <a:p>
+            <a:pPr lvl="1"/>
+            <a:r>
+              <a:rPr lang="en-GB" dirty="0"/>
+              <a:t>Metadata for barcode IDs</a:t>
+            </a:r>
+          </a:p>
+          <a:p>
+            <a:pPr lvl="1"/>
+            <a:r>
+              <a:rPr lang="en-GB" dirty="0"/>
+              <a:t>Metadata for samples</a:t>
+            </a:r>
+          </a:p>
+          <a:p>
+            <a:pPr lvl="1"/>
+            <a:r>
+              <a:rPr lang="en-GB" dirty="0"/>
+              <a:t>(normalised/binarized/raw) barcode counts</a:t>
+            </a:r>
+          </a:p>
+        </p:txBody>
+      </p:sp>
+    </p:spTree>
+    <p:extLst>
+      <p:ext uri="{BB962C8B-B14F-4D97-AF65-F5344CB8AC3E}">
+        <p14:creationId xmlns:p14="http://schemas.microsoft.com/office/powerpoint/2010/main" val="846846783"/>
+      </p:ext>
+    </p:extLst>
+  </p:cSld>
+  <p:clrMapOvr>
+    <a:masterClrMapping/>
+  </p:clrMapOvr>
+</p:sld>
+</file>
+
+<file path=ppt/slides/slide13.xml><?xml version="1.0" encoding="utf-8"?>
+<p:sld xmlns:a="http://schemas.openxmlformats.org/drawingml/2006/main" xmlns:r="http://schemas.openxmlformats.org/officeDocument/2006/relationships" xmlns:p="http://schemas.openxmlformats.org/presentationml/2006/main">
+  <p:cSld>
+    <p:spTree>
+      <p:nvGrpSpPr>
         <p:cNvPr id="1" name="Shape 160"/>
         <p:cNvGrpSpPr/>
         <p:nvPr/>
@@ -12581,7 +13713,7 @@
 </p:sld>
 </file>
 
-<file path=ppt/slides/slide11.xml><?xml version="1.0" encoding="utf-8"?>
+<file path=ppt/slides/slide14.xml><?xml version="1.0" encoding="utf-8"?>
 <p:sld xmlns:a="http://schemas.openxmlformats.org/drawingml/2006/main" xmlns:r="http://schemas.openxmlformats.org/officeDocument/2006/relationships" xmlns:p="http://schemas.openxmlformats.org/presentationml/2006/main">
   <p:cSld>
     <p:spTree>
@@ -12901,7 +14033,7 @@
 </p:sld>
 </file>
 
-<file path=ppt/slides/slide12.xml><?xml version="1.0" encoding="utf-8"?>
+<file path=ppt/slides/slide15.xml><?xml version="1.0" encoding="utf-8"?>
 <p:sld xmlns:a="http://schemas.openxmlformats.org/drawingml/2006/main" xmlns:r="http://schemas.openxmlformats.org/officeDocument/2006/relationships" xmlns:p="http://schemas.openxmlformats.org/presentationml/2006/main">
   <p:cSld>
     <p:spTree>

</xml_diff>